<commit_message>
Actualizacion s2 analisis de marketing powerpoint
</commit_message>
<xml_diff>
--- a/Equip_B/results/Marketing/S2_Presentación_Marketing.pptx
+++ b/Equip_B/results/Marketing/S2_Presentación_Marketing.pptx
@@ -5,10 +5,10 @@
     <p:sldMasterId id="2147483648" r:id="rId4"/>
   </p:sldMasterIdLst>
   <p:notesMasterIdLst>
-    <p:notesMasterId r:id="rId17"/>
+    <p:notesMasterId r:id="rId19"/>
   </p:notesMasterIdLst>
   <p:handoutMasterIdLst>
-    <p:handoutMasterId r:id="rId18"/>
+    <p:handoutMasterId r:id="rId20"/>
   </p:handoutMasterIdLst>
   <p:sldIdLst>
     <p:sldId id="324" r:id="rId5"/>
@@ -20,9 +20,11 @@
     <p:sldId id="354" r:id="rId11"/>
     <p:sldId id="359" r:id="rId12"/>
     <p:sldId id="360" r:id="rId13"/>
-    <p:sldId id="361" r:id="rId14"/>
-    <p:sldId id="349" r:id="rId15"/>
-    <p:sldId id="335" r:id="rId16"/>
+    <p:sldId id="363" r:id="rId14"/>
+    <p:sldId id="361" r:id="rId15"/>
+    <p:sldId id="362" r:id="rId16"/>
+    <p:sldId id="349" r:id="rId17"/>
+    <p:sldId id="335" r:id="rId18"/>
   </p:sldIdLst>
   <p:sldSz cx="12192000" cy="6858000"/>
   <p:notesSz cx="6858000" cy="9144000"/>
@@ -254,7 +256,7 @@
             <a:pPr rtl="0"/>
             <a:fld id="{75725A15-8D86-497D-8EAD-2EB1176C54F6}" type="datetime1">
               <a:rPr lang="es-ES" smtClean="0"/>
-              <a:t>19/10/2024</a:t>
+              <a:t>20/10/2024</a:t>
             </a:fld>
             <a:endParaRPr lang="es-ES"/>
           </a:p>
@@ -334,7 +336,7 @@
             <a:pPr rtl="0"/>
             <a:fld id="{682C0B10-7CAE-41E4-AB02-7E8B1FF2B898}" type="slidenum">
               <a:rPr lang="es-ES" smtClean="0"/>
-              <a:t>‹Nº›</a:t>
+              <a:t>‹#›</a:t>
             </a:fld>
             <a:endParaRPr lang="es-ES"/>
           </a:p>
@@ -436,7 +438,7 @@
             <a:fld id="{B958D509-07EE-4A09-900B-403023880868}" type="datetime1">
               <a:rPr lang="es-ES" smtClean="0"/>
               <a:pPr/>
-              <a:t>19/10/2024</a:t>
+              <a:t>20/10/2024</a:t>
             </a:fld>
             <a:endParaRPr lang="es-ES" dirty="0"/>
           </a:p>
@@ -597,7 +599,7 @@
             <a:pPr rtl="0"/>
             <a:fld id="{8530193B-564F-4854-8A52-728F3FB19C85}" type="slidenum">
               <a:rPr lang="es-ES" noProof="0" smtClean="0"/>
-              <a:t>‹Nº›</a:t>
+              <a:t>‹#›</a:t>
             </a:fld>
             <a:endParaRPr lang="es-ES" noProof="0"/>
           </a:p>
@@ -993,7 +995,7 @@
             <a:pPr rtl="0"/>
             <a:fld id="{8530193B-564F-4854-8A52-728F3FB19C85}" type="slidenum">
               <a:rPr lang="es-ES" noProof="0" smtClean="0"/>
-              <a:t>10</a:t>
+              <a:t>11</a:t>
             </a:fld>
             <a:endParaRPr lang="es-ES" noProof="0"/>
           </a:p>
@@ -1102,7 +1104,116 @@
             <a:pPr rtl="0"/>
             <a:fld id="{8530193B-564F-4854-8A52-728F3FB19C85}" type="slidenum">
               <a:rPr lang="es-ES" noProof="0" smtClean="0"/>
-              <a:t>11</a:t>
+              <a:t>12</a:t>
+            </a:fld>
+            <a:endParaRPr lang="es-ES" noProof="0"/>
+          </a:p>
+        </p:txBody>
+      </p:sp>
+    </p:spTree>
+    <p:extLst>
+      <p:ext uri="{BB962C8B-B14F-4D97-AF65-F5344CB8AC3E}">
+        <p14:creationId xmlns:p14="http://schemas.microsoft.com/office/powerpoint/2010/main" val="1804090616"/>
+      </p:ext>
+    </p:extLst>
+  </p:cSld>
+  <p:clrMapOvr>
+    <a:masterClrMapping/>
+  </p:clrMapOvr>
+</p:notes>
+</file>
+
+<file path=ppt/notesSlides/notesSlide5.xml><?xml version="1.0" encoding="utf-8"?>
+<p:notes xmlns:a="http://schemas.openxmlformats.org/drawingml/2006/main" xmlns:r="http://schemas.openxmlformats.org/officeDocument/2006/relationships" xmlns:p="http://schemas.openxmlformats.org/presentationml/2006/main">
+  <p:cSld>
+    <p:spTree>
+      <p:nvGrpSpPr>
+        <p:cNvPr id="1" name="">
+          <a:extLst>
+            <a:ext uri="{FF2B5EF4-FFF2-40B4-BE49-F238E27FC236}">
+              <a16:creationId xmlns:a16="http://schemas.microsoft.com/office/drawing/2014/main" id="{05DB5F8B-C47F-E364-FF4F-0710957ADB2F}"/>
+            </a:ext>
+          </a:extLst>
+        </p:cNvPr>
+        <p:cNvGrpSpPr/>
+        <p:nvPr/>
+      </p:nvGrpSpPr>
+      <p:grpSpPr>
+        <a:xfrm>
+          <a:off x="0" y="0"/>
+          <a:ext cx="0" cy="0"/>
+          <a:chOff x="0" y="0"/>
+          <a:chExt cx="0" cy="0"/>
+        </a:xfrm>
+      </p:grpSpPr>
+      <p:sp>
+        <p:nvSpPr>
+          <p:cNvPr id="2" name="Marcador de imagen de diapositiva 1">
+            <a:extLst>
+              <a:ext uri="{FF2B5EF4-FFF2-40B4-BE49-F238E27FC236}">
+                <a16:creationId xmlns:a16="http://schemas.microsoft.com/office/drawing/2014/main" id="{B43889D0-0E6B-1C3E-A08A-481B08938A4E}"/>
+              </a:ext>
+            </a:extLst>
+          </p:cNvPr>
+          <p:cNvSpPr>
+            <a:spLocks noGrp="1" noRot="1" noChangeAspect="1"/>
+          </p:cNvSpPr>
+          <p:nvPr>
+            <p:ph type="sldImg"/>
+          </p:nvPr>
+        </p:nvSpPr>
+        <p:spPr/>
+      </p:sp>
+      <p:sp>
+        <p:nvSpPr>
+          <p:cNvPr id="3" name="Marcador de notas 2">
+            <a:extLst>
+              <a:ext uri="{FF2B5EF4-FFF2-40B4-BE49-F238E27FC236}">
+                <a16:creationId xmlns:a16="http://schemas.microsoft.com/office/drawing/2014/main" id="{F62FB440-6DD3-AE5B-8243-49CB15AF8730}"/>
+              </a:ext>
+            </a:extLst>
+          </p:cNvPr>
+          <p:cNvSpPr>
+            <a:spLocks noGrp="1"/>
+          </p:cNvSpPr>
+          <p:nvPr>
+            <p:ph type="body" idx="1"/>
+          </p:nvPr>
+        </p:nvSpPr>
+        <p:spPr/>
+        <p:txBody>
+          <a:bodyPr/>
+          <a:lstStyle/>
+          <a:p>
+            <a:endParaRPr lang="es-ES" dirty="0"/>
+          </a:p>
+        </p:txBody>
+      </p:sp>
+      <p:sp>
+        <p:nvSpPr>
+          <p:cNvPr id="4" name="Marcador de número de diapositiva 3">
+            <a:extLst>
+              <a:ext uri="{FF2B5EF4-FFF2-40B4-BE49-F238E27FC236}">
+                <a16:creationId xmlns:a16="http://schemas.microsoft.com/office/drawing/2014/main" id="{95581750-F2D6-8825-E734-274E3CA2386C}"/>
+              </a:ext>
+            </a:extLst>
+          </p:cNvPr>
+          <p:cNvSpPr>
+            <a:spLocks noGrp="1"/>
+          </p:cNvSpPr>
+          <p:nvPr>
+            <p:ph type="sldNum" sz="quarter" idx="5"/>
+          </p:nvPr>
+        </p:nvSpPr>
+        <p:spPr/>
+        <p:txBody>
+          <a:bodyPr/>
+          <a:lstStyle/>
+          <a:p>
+            <a:pPr rtl="0"/>
+            <a:fld id="{8530193B-564F-4854-8A52-728F3FB19C85}" type="slidenum">
+              <a:rPr lang="es-ES" noProof="0" smtClean="0"/>
+              <a:t>13</a:t>
             </a:fld>
             <a:endParaRPr lang="es-ES" noProof="0"/>
           </a:p>
@@ -1121,7 +1232,7 @@
 </p:notes>
 </file>
 
-<file path=ppt/notesSlides/notesSlide5.xml><?xml version="1.0" encoding="utf-8"?>
+<file path=ppt/notesSlides/notesSlide6.xml><?xml version="1.0" encoding="utf-8"?>
 <p:notes xmlns:a="http://schemas.openxmlformats.org/drawingml/2006/main" xmlns:r="http://schemas.openxmlformats.org/officeDocument/2006/relationships" xmlns:p="http://schemas.openxmlformats.org/presentationml/2006/main">
   <p:cSld>
     <p:spTree>
@@ -1212,7 +1323,7 @@
             <a:pPr rtl="0"/>
             <a:fld id="{8530193B-564F-4854-8A52-728F3FB19C85}" type="slidenum">
               <a:rPr lang="es-ES" smtClean="0"/>
-              <a:t>12</a:t>
+              <a:t>14</a:t>
             </a:fld>
             <a:endParaRPr lang="es-ES"/>
           </a:p>
@@ -8022,7 +8133,7 @@
                   <a:schemeClr val="accent2"/>
                 </a:solidFill>
               </a:rPr>
-              <a:t>19/10/2024</a:t>
+              <a:t>20/10/2024</a:t>
             </a:fld>
             <a:endParaRPr lang="es-ES" sz="1100" noProof="0" dirty="0">
               <a:solidFill>
@@ -8294,7 +8405,7 @@
                 </a:solidFill>
               </a:rPr>
               <a:pPr algn="r" rtl="0"/>
-              <a:t>‹Nº›</a:t>
+              <a:t>‹#›</a:t>
             </a:fld>
             <a:endParaRPr lang="es-ES" sz="1100" noProof="0">
               <a:solidFill>
@@ -9078,7 +9189,7 @@
         <p:cNvPr id="1" name="">
           <a:extLst>
             <a:ext uri="{FF2B5EF4-FFF2-40B4-BE49-F238E27FC236}">
-              <a16:creationId xmlns:a16="http://schemas.microsoft.com/office/drawing/2014/main" id="{2E8AFFAE-1245-19B5-3C60-58AC8A5EA54D}"/>
+              <a16:creationId xmlns:a16="http://schemas.microsoft.com/office/drawing/2014/main" id="{2122DA3C-6319-0E9E-C653-C4A5E5E6A806}"/>
             </a:ext>
           </a:extLst>
         </p:cNvPr>
@@ -9095,10 +9206,10 @@
       </p:grpSpPr>
       <p:sp>
         <p:nvSpPr>
-          <p:cNvPr id="6" name="Rectángulo 5">
-            <a:extLst>
-              <a:ext uri="{FF2B5EF4-FFF2-40B4-BE49-F238E27FC236}">
-                <a16:creationId xmlns:a16="http://schemas.microsoft.com/office/drawing/2014/main" id="{82C12619-B1CF-D3F7-B28B-32652C0F05E3}"/>
+          <p:cNvPr id="5" name="Rectángulo 4">
+            <a:extLst>
+              <a:ext uri="{FF2B5EF4-FFF2-40B4-BE49-F238E27FC236}">
+                <a16:creationId xmlns:a16="http://schemas.microsoft.com/office/drawing/2014/main" id="{882A1661-D4E8-303B-BA24-F14D615D13C4}"/>
               </a:ext>
             </a:extLst>
           </p:cNvPr>
@@ -9149,10 +9260,200 @@
       </p:sp>
       <p:sp>
         <p:nvSpPr>
-          <p:cNvPr id="4" name="Rectángulo: esquinas redondeadas 3">
-            <a:extLst>
-              <a:ext uri="{FF2B5EF4-FFF2-40B4-BE49-F238E27FC236}">
-                <a16:creationId xmlns:a16="http://schemas.microsoft.com/office/drawing/2014/main" id="{0EF04D99-B7F8-3573-2F18-E88215F913F3}"/>
+          <p:cNvPr id="9" name="QuadreDeText 3">
+            <a:extLst>
+              <a:ext uri="{FF2B5EF4-FFF2-40B4-BE49-F238E27FC236}">
+                <a16:creationId xmlns:a16="http://schemas.microsoft.com/office/drawing/2014/main" id="{E3C7FFE1-A797-62BF-BC16-BAA12271AC8E}"/>
+              </a:ext>
+            </a:extLst>
+          </p:cNvPr>
+          <p:cNvSpPr txBox="1"/>
+          <p:nvPr/>
+        </p:nvSpPr>
+        <p:spPr>
+          <a:xfrm>
+            <a:off x="505958" y="250347"/>
+            <a:ext cx="11230211" cy="461665"/>
+          </a:xfrm>
+          <a:prstGeom prst="rect">
+            <a:avLst/>
+          </a:prstGeom>
+          <a:noFill/>
+        </p:spPr>
+        <p:txBody>
+          <a:bodyPr wrap="square">
+            <a:spAutoFit/>
+          </a:bodyPr>
+          <a:lstStyle/>
+          <a:p>
+            <a:r>
+              <a:rPr lang="es-ES" sz="2400" b="1" dirty="0">
+                <a:solidFill>
+                  <a:schemeClr val="accent3">
+                    <a:lumMod val="50000"/>
+                  </a:schemeClr>
+                </a:solidFill>
+                <a:effectLst/>
+                <a:latin typeface="+mj-lt"/>
+              </a:rPr>
+              <a:t>Tasa de Conversión por Rango de Campañas y Cuartil de Edad</a:t>
+            </a:r>
+            <a:endParaRPr lang="es-ES" sz="2400" b="1" i="1" dirty="0">
+              <a:solidFill>
+                <a:schemeClr val="accent3">
+                  <a:lumMod val="50000"/>
+                </a:schemeClr>
+              </a:solidFill>
+              <a:effectLst/>
+              <a:latin typeface="+mj-lt"/>
+            </a:endParaRPr>
+          </a:p>
+        </p:txBody>
+      </p:sp>
+      <p:sp>
+        <p:nvSpPr>
+          <p:cNvPr id="8" name="QuadreDeText 16">
+            <a:extLst>
+              <a:ext uri="{FF2B5EF4-FFF2-40B4-BE49-F238E27FC236}">
+                <a16:creationId xmlns:a16="http://schemas.microsoft.com/office/drawing/2014/main" id="{A35D8D08-73A8-4B79-4525-ACDE3CACF457}"/>
+              </a:ext>
+            </a:extLst>
+          </p:cNvPr>
+          <p:cNvSpPr txBox="1"/>
+          <p:nvPr/>
+        </p:nvSpPr>
+        <p:spPr>
+          <a:xfrm>
+            <a:off x="9255760" y="1678428"/>
+            <a:ext cx="2506502" cy="1055608"/>
+          </a:xfrm>
+          <a:prstGeom prst="roundRect">
+            <a:avLst/>
+          </a:prstGeom>
+          <a:solidFill>
+            <a:schemeClr val="accent5">
+              <a:lumMod val="25000"/>
+              <a:lumOff val="75000"/>
+            </a:schemeClr>
+          </a:solidFill>
+          <a:ln>
+            <a:solidFill>
+              <a:schemeClr val="bg1"/>
+            </a:solidFill>
+          </a:ln>
+        </p:spPr>
+        <p:txBody>
+          <a:bodyPr wrap="square">
+            <a:spAutoFit/>
+          </a:bodyPr>
+          <a:lstStyle/>
+          <a:p>
+            <a:pPr>
+              <a:buFont typeface="Arial" panose="020B0604020202020204" pitchFamily="34" charset="0"/>
+              <a:buChar char="•"/>
+            </a:pPr>
+            <a:r>
+              <a:rPr lang="es-ES" sz="1400" b="1" dirty="0"/>
+              <a:t>Las campañas prolongadas</a:t>
+            </a:r>
+            <a:r>
+              <a:rPr lang="es-ES" sz="1400" dirty="0"/>
+              <a:t> (16-20) muestran bajas tasas de conversión para todos los grupos de edad.</a:t>
+            </a:r>
+            <a:endParaRPr lang="es-ES" sz="1300" dirty="0"/>
+          </a:p>
+        </p:txBody>
+      </p:sp>
+      <p:pic>
+        <p:nvPicPr>
+          <p:cNvPr id="4" name="Picture 3">
+            <a:extLst>
+              <a:ext uri="{FF2B5EF4-FFF2-40B4-BE49-F238E27FC236}">
+                <a16:creationId xmlns:a16="http://schemas.microsoft.com/office/drawing/2014/main" id="{A3C9B02D-F0A0-4376-9E9C-70885B7D2F9E}"/>
+              </a:ext>
+            </a:extLst>
+          </p:cNvPr>
+          <p:cNvPicPr>
+            <a:picLocks noChangeAspect="1"/>
+          </p:cNvPicPr>
+          <p:nvPr/>
+        </p:nvPicPr>
+        <p:blipFill>
+          <a:blip r:embed="rId2"/>
+          <a:stretch>
+            <a:fillRect/>
+          </a:stretch>
+        </p:blipFill>
+        <p:spPr>
+          <a:xfrm>
+            <a:off x="501928" y="813206"/>
+            <a:ext cx="8686800" cy="5486400"/>
+          </a:xfrm>
+          <a:prstGeom prst="rect">
+            <a:avLst/>
+          </a:prstGeom>
+        </p:spPr>
+      </p:pic>
+      <p:sp>
+        <p:nvSpPr>
+          <p:cNvPr id="10" name="QuadreDeText 16">
+            <a:extLst>
+              <a:ext uri="{FF2B5EF4-FFF2-40B4-BE49-F238E27FC236}">
+                <a16:creationId xmlns:a16="http://schemas.microsoft.com/office/drawing/2014/main" id="{676C48C4-8474-4257-BF6A-457CAEDB95B1}"/>
+              </a:ext>
+            </a:extLst>
+          </p:cNvPr>
+          <p:cNvSpPr txBox="1"/>
+          <p:nvPr/>
+        </p:nvSpPr>
+        <p:spPr>
+          <a:xfrm>
+            <a:off x="9255760" y="3020376"/>
+            <a:ext cx="2506502" cy="817245"/>
+          </a:xfrm>
+          <a:prstGeom prst="roundRect">
+            <a:avLst/>
+          </a:prstGeom>
+          <a:solidFill>
+            <a:schemeClr val="accent5">
+              <a:lumMod val="25000"/>
+              <a:lumOff val="75000"/>
+            </a:schemeClr>
+          </a:solidFill>
+          <a:ln>
+            <a:solidFill>
+              <a:schemeClr val="bg1"/>
+            </a:solidFill>
+          </a:ln>
+        </p:spPr>
+        <p:txBody>
+          <a:bodyPr wrap="square">
+            <a:spAutoFit/>
+          </a:bodyPr>
+          <a:lstStyle/>
+          <a:p>
+            <a:pPr>
+              <a:buFont typeface="Arial" panose="020B0604020202020204" pitchFamily="34" charset="0"/>
+              <a:buChar char="•"/>
+            </a:pPr>
+            <a:r>
+              <a:rPr lang="es-ES" sz="1400" b="1" dirty="0"/>
+              <a:t>Adultos medios (40-49 años)</a:t>
+            </a:r>
+            <a:r>
+              <a:rPr lang="es-ES" sz="1400" dirty="0"/>
+              <a:t> presentan un repunte en campañas intermedias (11-15)</a:t>
+            </a:r>
+            <a:endParaRPr lang="es-ES" sz="1300" dirty="0"/>
+          </a:p>
+        </p:txBody>
+      </p:sp>
+      <p:sp>
+        <p:nvSpPr>
+          <p:cNvPr id="7" name="Rectangle: Rounded Corners 6">
+            <a:extLst>
+              <a:ext uri="{FF2B5EF4-FFF2-40B4-BE49-F238E27FC236}">
+                <a16:creationId xmlns:a16="http://schemas.microsoft.com/office/drawing/2014/main" id="{543ABE2F-A170-4447-AC50-455AA554D81A}"/>
               </a:ext>
             </a:extLst>
           </p:cNvPr>
@@ -9161,19 +9462,17 @@
         </p:nvSpPr>
         <p:spPr>
           <a:xfrm>
-            <a:off x="455833" y="1625256"/>
-            <a:ext cx="5344932" cy="4803820"/>
+            <a:off x="1320800" y="1239520"/>
+            <a:ext cx="1524000" cy="4805274"/>
           </a:xfrm>
           <a:prstGeom prst="roundRect">
-            <a:avLst>
-              <a:gd name="adj" fmla="val 7845"/>
-            </a:avLst>
-          </a:prstGeom>
-          <a:solidFill>
-            <a:schemeClr val="bg1"/>
-          </a:solidFill>
-          <a:ln>
-            <a:noFill/>
+            <a:avLst/>
+          </a:prstGeom>
+          <a:noFill/>
+          <a:ln w="38100">
+            <a:solidFill>
+              <a:srgbClr val="00B050"/>
+            </a:solidFill>
           </a:ln>
         </p:spPr>
         <p:style>
@@ -9197,16 +9496,16 @@
           <a:lstStyle/>
           <a:p>
             <a:pPr algn="ctr"/>
-            <a:endParaRPr lang="es-ES" dirty="0"/>
-          </a:p>
-        </p:txBody>
-      </p:sp>
-      <p:sp>
-        <p:nvSpPr>
-          <p:cNvPr id="5" name="QuadreDeText 3">
-            <a:extLst>
-              <a:ext uri="{FF2B5EF4-FFF2-40B4-BE49-F238E27FC236}">
-                <a16:creationId xmlns:a16="http://schemas.microsoft.com/office/drawing/2014/main" id="{8D4C57D9-90FA-1254-9EC5-207A0AEE2D7F}"/>
+            <a:endParaRPr lang="en-US"/>
+          </a:p>
+        </p:txBody>
+      </p:sp>
+      <p:sp>
+        <p:nvSpPr>
+          <p:cNvPr id="13" name="QuadreDeText 16">
+            <a:extLst>
+              <a:ext uri="{FF2B5EF4-FFF2-40B4-BE49-F238E27FC236}">
+                <a16:creationId xmlns:a16="http://schemas.microsoft.com/office/drawing/2014/main" id="{7C48CBDD-4AF9-432B-8FFB-8E411E8FC9C6}"/>
               </a:ext>
             </a:extLst>
           </p:cNvPr>
@@ -9215,13 +9514,23 @@
         </p:nvSpPr>
         <p:spPr>
           <a:xfrm>
-            <a:off x="505958" y="250347"/>
-            <a:ext cx="11230211" cy="707886"/>
-          </a:xfrm>
-          <a:prstGeom prst="rect">
-            <a:avLst/>
-          </a:prstGeom>
-          <a:noFill/>
+            <a:off x="9255760" y="813206"/>
+            <a:ext cx="2506502" cy="578882"/>
+          </a:xfrm>
+          <a:prstGeom prst="roundRect">
+            <a:avLst/>
+          </a:prstGeom>
+          <a:solidFill>
+            <a:schemeClr val="accent5">
+              <a:lumMod val="25000"/>
+              <a:lumOff val="75000"/>
+            </a:schemeClr>
+          </a:solidFill>
+          <a:ln>
+            <a:solidFill>
+              <a:schemeClr val="bg1"/>
+            </a:solidFill>
+          </a:ln>
         </p:spPr>
         <p:txBody>
           <a:bodyPr wrap="square">
@@ -9229,124 +9538,64 @@
           </a:bodyPr>
           <a:lstStyle/>
           <a:p>
-            <a:r>
-              <a:rPr lang="es-ES" sz="2400" b="1" dirty="0">
-                <a:solidFill>
-                  <a:schemeClr val="accent3">
-                    <a:lumMod val="50000"/>
-                  </a:schemeClr>
-                </a:solidFill>
-                <a:effectLst/>
-                <a:latin typeface="+mj-lt"/>
-              </a:rPr>
-              <a:t>PROPUESTAS DE AJUSTE DE LOS MÉTODOS DE CONTACTO</a:t>
-            </a:r>
-          </a:p>
-          <a:p>
-            <a:r>
-              <a:rPr lang="es-ES" sz="1400" b="1" dirty="0"/>
-              <a:t>¿</a:t>
-            </a:r>
-            <a:r>
-              <a:rPr lang="es-ES" sz="1600" b="1" dirty="0"/>
-              <a:t>Qué ajustes podríamos realizar a nuestros métodos de contacto para mejorar la tasa de respuesta?</a:t>
-            </a:r>
-          </a:p>
-        </p:txBody>
-      </p:sp>
-      <p:sp>
-        <p:nvSpPr>
-          <p:cNvPr id="30" name="CuadroTexto 29">
-            <a:extLst>
-              <a:ext uri="{FF2B5EF4-FFF2-40B4-BE49-F238E27FC236}">
-                <a16:creationId xmlns:a16="http://schemas.microsoft.com/office/drawing/2014/main" id="{6B0A3DF6-5B8C-C82E-4007-09D066866A92}"/>
-              </a:ext>
-            </a:extLst>
-          </p:cNvPr>
-          <p:cNvSpPr txBox="1"/>
-          <p:nvPr/>
-        </p:nvSpPr>
-        <p:spPr>
-          <a:xfrm>
-            <a:off x="825135" y="2523781"/>
-            <a:ext cx="4365989" cy="2272963"/>
-          </a:xfrm>
-          <a:prstGeom prst="roundRect">
-            <a:avLst/>
-          </a:prstGeom>
-          <a:noFill/>
-          <a:ln w="19050">
-            <a:solidFill>
-              <a:srgbClr val="92D050"/>
-            </a:solidFill>
-            <a:prstDash val="sysDash"/>
-          </a:ln>
-        </p:spPr>
-        <p:txBody>
-          <a:bodyPr wrap="square">
-            <a:spAutoFit/>
-          </a:bodyPr>
-          <a:lstStyle/>
-          <a:p>
-            <a:pPr marL="171450" indent="-171450" algn="just">
-              <a:spcBef>
-                <a:spcPts val="300"/>
-              </a:spcBef>
+            <a:pPr>
               <a:buFont typeface="Arial" panose="020B0604020202020204" pitchFamily="34" charset="0"/>
               <a:buChar char="•"/>
             </a:pPr>
             <a:r>
-              <a:rPr lang="es-ES" sz="1200" dirty="0"/>
-              <a:t>Si el cliente tiene más de 34 años y un balance superior a 230 (rango bajo).</a:t>
-            </a:r>
-          </a:p>
-          <a:p>
-            <a:pPr marL="171450" indent="-171450" algn="just">
-              <a:spcBef>
-                <a:spcPts val="300"/>
-              </a:spcBef>
-              <a:buFont typeface="Arial" panose="020B0604020202020204" pitchFamily="34" charset="0"/>
-              <a:buChar char="•"/>
-            </a:pPr>
-            <a:r>
-              <a:rPr lang="es-ES" sz="1200" dirty="0"/>
-              <a:t>Se intentará que el teleoperador tenga una  edad superior a 34 años para fortalece la credibilidad.</a:t>
-            </a:r>
-          </a:p>
-          <a:p>
-            <a:pPr marL="171450" indent="-171450" algn="just">
-              <a:spcBef>
-                <a:spcPts val="300"/>
-              </a:spcBef>
-              <a:buFont typeface="Arial" panose="020B0604020202020204" pitchFamily="34" charset="0"/>
-              <a:buChar char="•"/>
-            </a:pPr>
-            <a:r>
-              <a:rPr lang="es-ES" sz="1200" dirty="0"/>
-              <a:t>El guion de la llamada por fijo deberá ser distinto, con un lenguaje más formal, que el empleado cuando se llama por móvil.</a:t>
-            </a:r>
-          </a:p>
-          <a:p>
-            <a:pPr marL="171450" indent="-171450" algn="just">
-              <a:spcBef>
-                <a:spcPts val="300"/>
-              </a:spcBef>
-              <a:buFont typeface="Arial" panose="020B0604020202020204" pitchFamily="34" charset="0"/>
-              <a:buChar char="•"/>
-            </a:pPr>
-            <a:r>
-              <a:rPr lang="es-ES" sz="1200" dirty="0"/>
-              <a:t>Si al cliente es la primera vez que se le llama, no se podrían aplicar todas las recomendaciones anteriores. Quedaría pendiente de estudio.</a:t>
-            </a:r>
-          </a:p>
-        </p:txBody>
-      </p:sp>
-      <p:sp>
-        <p:nvSpPr>
-          <p:cNvPr id="31" name="Rectángulo: esquinas redondeadas 30">
-            <a:extLst>
-              <a:ext uri="{FF2B5EF4-FFF2-40B4-BE49-F238E27FC236}">
-                <a16:creationId xmlns:a16="http://schemas.microsoft.com/office/drawing/2014/main" id="{2A86DF7C-2112-699E-12B5-9B66B3CC713C}"/>
+              <a:rPr lang="es-ES" sz="1400" dirty="0"/>
+              <a:t>Nuestra mejor tasa son en </a:t>
+            </a:r>
+            <a:r>
+              <a:rPr lang="es-ES" sz="1400" b="1" dirty="0"/>
+              <a:t>las primeras 5 campañas</a:t>
+            </a:r>
+            <a:endParaRPr lang="es-ES" sz="1300" dirty="0"/>
+          </a:p>
+        </p:txBody>
+      </p:sp>
+    </p:spTree>
+    <p:extLst>
+      <p:ext uri="{BB962C8B-B14F-4D97-AF65-F5344CB8AC3E}">
+        <p14:creationId xmlns:p14="http://schemas.microsoft.com/office/powerpoint/2010/main" val="596771698"/>
+      </p:ext>
+    </p:extLst>
+  </p:cSld>
+  <p:clrMapOvr>
+    <a:masterClrMapping/>
+  </p:clrMapOvr>
+</p:sld>
+</file>
+
+<file path=ppt/slides/slide11.xml><?xml version="1.0" encoding="utf-8"?>
+<p:sld xmlns:a="http://schemas.openxmlformats.org/drawingml/2006/main" xmlns:r="http://schemas.openxmlformats.org/officeDocument/2006/relationships" xmlns:p="http://schemas.openxmlformats.org/presentationml/2006/main">
+  <p:cSld>
+    <p:spTree>
+      <p:nvGrpSpPr>
+        <p:cNvPr id="1" name="">
+          <a:extLst>
+            <a:ext uri="{FF2B5EF4-FFF2-40B4-BE49-F238E27FC236}">
+              <a16:creationId xmlns:a16="http://schemas.microsoft.com/office/drawing/2014/main" id="{2E8AFFAE-1245-19B5-3C60-58AC8A5EA54D}"/>
+            </a:ext>
+          </a:extLst>
+        </p:cNvPr>
+        <p:cNvGrpSpPr/>
+        <p:nvPr/>
+      </p:nvGrpSpPr>
+      <p:grpSpPr>
+        <a:xfrm>
+          <a:off x="0" y="0"/>
+          <a:ext cx="0" cy="0"/>
+          <a:chOff x="0" y="0"/>
+          <a:chExt cx="0" cy="0"/>
+        </a:xfrm>
+      </p:grpSpPr>
+      <p:sp>
+        <p:nvSpPr>
+          <p:cNvPr id="6" name="Rectángulo 5">
+            <a:extLst>
+              <a:ext uri="{FF2B5EF4-FFF2-40B4-BE49-F238E27FC236}">
+                <a16:creationId xmlns:a16="http://schemas.microsoft.com/office/drawing/2014/main" id="{82C12619-B1CF-D3F7-B28B-32652C0F05E3}"/>
               </a:ext>
             </a:extLst>
           </p:cNvPr>
@@ -9355,16 +9604,16 @@
         </p:nvSpPr>
         <p:spPr>
           <a:xfrm>
-            <a:off x="6371770" y="1625256"/>
-            <a:ext cx="5344932" cy="4803820"/>
-          </a:xfrm>
-          <a:prstGeom prst="roundRect">
-            <a:avLst>
-              <a:gd name="adj" fmla="val 7845"/>
-            </a:avLst>
+            <a:off x="0" y="6400800"/>
+            <a:ext cx="2557670" cy="457200"/>
+          </a:xfrm>
+          <a:prstGeom prst="rect">
+            <a:avLst/>
           </a:prstGeom>
           <a:solidFill>
-            <a:schemeClr val="bg1"/>
+            <a:schemeClr val="bg1">
+              <a:lumMod val="95000"/>
+            </a:schemeClr>
           </a:solidFill>
           <a:ln>
             <a:noFill/>
@@ -9397,60 +9646,10 @@
       </p:sp>
       <p:sp>
         <p:nvSpPr>
-          <p:cNvPr id="2" name="CuadroTexto 1">
-            <a:extLst>
-              <a:ext uri="{FF2B5EF4-FFF2-40B4-BE49-F238E27FC236}">
-                <a16:creationId xmlns:a16="http://schemas.microsoft.com/office/drawing/2014/main" id="{FB4A5B90-D21B-B193-A37A-573840257D21}"/>
-              </a:ext>
-            </a:extLst>
-          </p:cNvPr>
-          <p:cNvSpPr txBox="1"/>
-          <p:nvPr/>
-        </p:nvSpPr>
-        <p:spPr>
-          <a:xfrm>
-            <a:off x="531964" y="999357"/>
-            <a:ext cx="9318320" cy="584775"/>
-          </a:xfrm>
-          <a:prstGeom prst="rect">
-            <a:avLst/>
-          </a:prstGeom>
-          <a:noFill/>
-        </p:spPr>
-        <p:txBody>
-          <a:bodyPr wrap="none" rtlCol="0">
-            <a:spAutoFit/>
-          </a:bodyPr>
-          <a:lstStyle/>
-          <a:p>
-            <a:r>
-              <a:rPr lang="es-ES" sz="1600" dirty="0"/>
-              <a:t>Nos enfocaríamos al rango con más probabilidad de contratación, </a:t>
-            </a:r>
-            <a:r>
-              <a:rPr lang="es-ES" sz="1600" b="1" dirty="0"/>
-              <a:t>entre duraciones 7 a 17 min como el Sprint 1, </a:t>
-            </a:r>
-          </a:p>
-          <a:p>
-            <a:r>
-              <a:rPr lang="es-ES" sz="1600" dirty="0"/>
-              <a:t>y que le han llamado en campañas anteriores</a:t>
-            </a:r>
-            <a:r>
-              <a:rPr lang="es-ES" sz="1600" b="1" dirty="0"/>
-              <a:t>.</a:t>
-            </a:r>
-            <a:endParaRPr lang="es-ES" sz="1600" dirty="0"/>
-          </a:p>
-        </p:txBody>
-      </p:sp>
-      <p:sp>
-        <p:nvSpPr>
-          <p:cNvPr id="9" name="Rectángulo: esquinas redondeadas 8">
-            <a:extLst>
-              <a:ext uri="{FF2B5EF4-FFF2-40B4-BE49-F238E27FC236}">
-                <a16:creationId xmlns:a16="http://schemas.microsoft.com/office/drawing/2014/main" id="{3FAEE228-6729-211B-2A46-8B3A02A83818}"/>
+          <p:cNvPr id="4" name="Rectángulo: esquinas redondeadas 3">
+            <a:extLst>
+              <a:ext uri="{FF2B5EF4-FFF2-40B4-BE49-F238E27FC236}">
+                <a16:creationId xmlns:a16="http://schemas.microsoft.com/office/drawing/2014/main" id="{0EF04D99-B7F8-3573-2F18-E88215F913F3}"/>
               </a:ext>
             </a:extLst>
           </p:cNvPr>
@@ -9459,21 +9658,19 @@
         </p:nvSpPr>
         <p:spPr>
           <a:xfrm>
-            <a:off x="825135" y="1954635"/>
-            <a:ext cx="4042140" cy="327132"/>
+            <a:off x="455833" y="1625256"/>
+            <a:ext cx="5344932" cy="4803820"/>
           </a:xfrm>
           <a:prstGeom prst="roundRect">
             <a:avLst>
-              <a:gd name="adj" fmla="val 27880"/>
+              <a:gd name="adj" fmla="val 7845"/>
             </a:avLst>
           </a:prstGeom>
           <a:solidFill>
-            <a:srgbClr val="D2ECB6"/>
+            <a:schemeClr val="bg1"/>
           </a:solidFill>
           <a:ln>
-            <a:solidFill>
-              <a:srgbClr val="92D050"/>
-            </a:solidFill>
+            <a:noFill/>
           </a:ln>
         </p:spPr>
         <p:style>
@@ -9497,46 +9694,177 @@
           <a:lstStyle/>
           <a:p>
             <a:pPr algn="ctr"/>
-            <a:r>
-              <a:rPr lang="es-ES" sz="1400" dirty="0">
+            <a:endParaRPr lang="es-ES" dirty="0"/>
+          </a:p>
+        </p:txBody>
+      </p:sp>
+      <p:sp>
+        <p:nvSpPr>
+          <p:cNvPr id="5" name="QuadreDeText 3">
+            <a:extLst>
+              <a:ext uri="{FF2B5EF4-FFF2-40B4-BE49-F238E27FC236}">
+                <a16:creationId xmlns:a16="http://schemas.microsoft.com/office/drawing/2014/main" id="{8D4C57D9-90FA-1254-9EC5-207A0AEE2D7F}"/>
+              </a:ext>
+            </a:extLst>
+          </p:cNvPr>
+          <p:cNvSpPr txBox="1"/>
+          <p:nvPr/>
+        </p:nvSpPr>
+        <p:spPr>
+          <a:xfrm>
+            <a:off x="505958" y="250347"/>
+            <a:ext cx="11230211" cy="707886"/>
+          </a:xfrm>
+          <a:prstGeom prst="rect">
+            <a:avLst/>
+          </a:prstGeom>
+          <a:noFill/>
+        </p:spPr>
+        <p:txBody>
+          <a:bodyPr wrap="square">
+            <a:spAutoFit/>
+          </a:bodyPr>
+          <a:lstStyle/>
+          <a:p>
+            <a:r>
+              <a:rPr lang="es-ES" sz="2400" b="1" dirty="0">
                 <a:solidFill>
-                  <a:schemeClr val="tx1"/>
+                  <a:schemeClr val="accent3">
+                    <a:lumMod val="50000"/>
+                  </a:schemeClr>
                 </a:solidFill>
+                <a:effectLst/>
+                <a:latin typeface="+mj-lt"/>
               </a:rPr>
-              <a:t>¿Cuándo deberíamos priorizar llamar a teléfono fijo?</a:t>
-            </a:r>
-          </a:p>
-        </p:txBody>
-      </p:sp>
-      <p:sp>
-        <p:nvSpPr>
-          <p:cNvPr id="10" name="Rectángulo: esquinas redondeadas 9">
-            <a:extLst>
-              <a:ext uri="{FF2B5EF4-FFF2-40B4-BE49-F238E27FC236}">
-                <a16:creationId xmlns:a16="http://schemas.microsoft.com/office/drawing/2014/main" id="{BEEFA64B-D29F-CD76-5F2E-B88DC42940CE}"/>
-              </a:ext>
-            </a:extLst>
-          </p:cNvPr>
-          <p:cNvSpPr/>
+              <a:t>PROPUESTAS DE AJUSTE DE LOS MÉTODOS DE CONTACTO</a:t>
+            </a:r>
+          </a:p>
+          <a:p>
+            <a:r>
+              <a:rPr lang="es-ES" sz="1400" b="1" dirty="0"/>
+              <a:t>¿</a:t>
+            </a:r>
+            <a:r>
+              <a:rPr lang="es-ES" sz="1600" b="1" dirty="0"/>
+              <a:t>Qué ajustes podríamos realizar a nuestros métodos de contacto para mejorar la tasa de respuesta?</a:t>
+            </a:r>
+          </a:p>
+        </p:txBody>
+      </p:sp>
+      <p:sp>
+        <p:nvSpPr>
+          <p:cNvPr id="30" name="CuadroTexto 29">
+            <a:extLst>
+              <a:ext uri="{FF2B5EF4-FFF2-40B4-BE49-F238E27FC236}">
+                <a16:creationId xmlns:a16="http://schemas.microsoft.com/office/drawing/2014/main" id="{6B0A3DF6-5B8C-C82E-4007-09D066866A92}"/>
+              </a:ext>
+            </a:extLst>
+          </p:cNvPr>
+          <p:cNvSpPr txBox="1"/>
           <p:nvPr/>
         </p:nvSpPr>
         <p:spPr>
           <a:xfrm>
-            <a:off x="6863985" y="1908876"/>
-            <a:ext cx="3756390" cy="324423"/>
+            <a:off x="825135" y="2523781"/>
+            <a:ext cx="4365989" cy="2272963"/>
           </a:xfrm>
           <a:prstGeom prst="roundRect">
-            <a:avLst>
-              <a:gd name="adj" fmla="val 27880"/>
-            </a:avLst>
-          </a:prstGeom>
-          <a:solidFill>
-            <a:srgbClr val="D2ECB6"/>
-          </a:solidFill>
-          <a:ln>
+            <a:avLst/>
+          </a:prstGeom>
+          <a:noFill/>
+          <a:ln w="19050">
             <a:solidFill>
               <a:srgbClr val="92D050"/>
             </a:solidFill>
+            <a:prstDash val="sysDash"/>
+          </a:ln>
+        </p:spPr>
+        <p:txBody>
+          <a:bodyPr wrap="square">
+            <a:spAutoFit/>
+          </a:bodyPr>
+          <a:lstStyle/>
+          <a:p>
+            <a:pPr marL="171450" indent="-171450" algn="just">
+              <a:spcBef>
+                <a:spcPts val="300"/>
+              </a:spcBef>
+              <a:buFont typeface="Arial" panose="020B0604020202020204" pitchFamily="34" charset="0"/>
+              <a:buChar char="•"/>
+            </a:pPr>
+            <a:r>
+              <a:rPr lang="es-ES" sz="1200" dirty="0"/>
+              <a:t>Si el cliente tiene más de 34 años y un balance superior a 230 (rango bajo).</a:t>
+            </a:r>
+          </a:p>
+          <a:p>
+            <a:pPr marL="171450" indent="-171450" algn="just">
+              <a:spcBef>
+                <a:spcPts val="300"/>
+              </a:spcBef>
+              <a:buFont typeface="Arial" panose="020B0604020202020204" pitchFamily="34" charset="0"/>
+              <a:buChar char="•"/>
+            </a:pPr>
+            <a:r>
+              <a:rPr lang="es-ES" sz="1200" dirty="0"/>
+              <a:t>Se intentará que el teleoperador tenga una  edad superior a 34 años para fortalece la credibilidad.</a:t>
+            </a:r>
+          </a:p>
+          <a:p>
+            <a:pPr marL="171450" indent="-171450" algn="just">
+              <a:spcBef>
+                <a:spcPts val="300"/>
+              </a:spcBef>
+              <a:buFont typeface="Arial" panose="020B0604020202020204" pitchFamily="34" charset="0"/>
+              <a:buChar char="•"/>
+            </a:pPr>
+            <a:r>
+              <a:rPr lang="es-ES" sz="1200" dirty="0"/>
+              <a:t>El guion de la llamada por fijo deberá ser distinto, con un lenguaje más formal, que el empleado cuando se llama por móvil.</a:t>
+            </a:r>
+          </a:p>
+          <a:p>
+            <a:pPr marL="171450" indent="-171450" algn="just">
+              <a:spcBef>
+                <a:spcPts val="300"/>
+              </a:spcBef>
+              <a:buFont typeface="Arial" panose="020B0604020202020204" pitchFamily="34" charset="0"/>
+              <a:buChar char="•"/>
+            </a:pPr>
+            <a:r>
+              <a:rPr lang="es-ES" sz="1200" dirty="0"/>
+              <a:t>Si al cliente es la primera vez que se le llama, no se podrían aplicar todas las recomendaciones anteriores. Quedaría pendiente de estudio.</a:t>
+            </a:r>
+          </a:p>
+        </p:txBody>
+      </p:sp>
+      <p:sp>
+        <p:nvSpPr>
+          <p:cNvPr id="31" name="Rectángulo: esquinas redondeadas 30">
+            <a:extLst>
+              <a:ext uri="{FF2B5EF4-FFF2-40B4-BE49-F238E27FC236}">
+                <a16:creationId xmlns:a16="http://schemas.microsoft.com/office/drawing/2014/main" id="{2A86DF7C-2112-699E-12B5-9B66B3CC713C}"/>
+              </a:ext>
+            </a:extLst>
+          </p:cNvPr>
+          <p:cNvSpPr/>
+          <p:nvPr/>
+        </p:nvSpPr>
+        <p:spPr>
+          <a:xfrm>
+            <a:off x="6371770" y="1625256"/>
+            <a:ext cx="5344932" cy="4803820"/>
+          </a:xfrm>
+          <a:prstGeom prst="roundRect">
+            <a:avLst>
+              <a:gd name="adj" fmla="val 7845"/>
+            </a:avLst>
+          </a:prstGeom>
+          <a:solidFill>
+            <a:schemeClr val="bg1"/>
+          </a:solidFill>
+          <a:ln>
+            <a:noFill/>
           </a:ln>
         </p:spPr>
         <p:style>
@@ -9560,6 +9888,175 @@
           <a:lstStyle/>
           <a:p>
             <a:pPr algn="ctr"/>
+            <a:endParaRPr lang="es-ES"/>
+          </a:p>
+        </p:txBody>
+      </p:sp>
+      <p:sp>
+        <p:nvSpPr>
+          <p:cNvPr id="2" name="CuadroTexto 1">
+            <a:extLst>
+              <a:ext uri="{FF2B5EF4-FFF2-40B4-BE49-F238E27FC236}">
+                <a16:creationId xmlns:a16="http://schemas.microsoft.com/office/drawing/2014/main" id="{FB4A5B90-D21B-B193-A37A-573840257D21}"/>
+              </a:ext>
+            </a:extLst>
+          </p:cNvPr>
+          <p:cNvSpPr txBox="1"/>
+          <p:nvPr/>
+        </p:nvSpPr>
+        <p:spPr>
+          <a:xfrm>
+            <a:off x="531964" y="999357"/>
+            <a:ext cx="9318320" cy="584775"/>
+          </a:xfrm>
+          <a:prstGeom prst="rect">
+            <a:avLst/>
+          </a:prstGeom>
+          <a:noFill/>
+        </p:spPr>
+        <p:txBody>
+          <a:bodyPr wrap="none" rtlCol="0">
+            <a:spAutoFit/>
+          </a:bodyPr>
+          <a:lstStyle/>
+          <a:p>
+            <a:r>
+              <a:rPr lang="es-ES" sz="1600" dirty="0"/>
+              <a:t>Nos enfocaríamos al rango con más probabilidad de contratación, </a:t>
+            </a:r>
+            <a:r>
+              <a:rPr lang="es-ES" sz="1600" b="1" dirty="0"/>
+              <a:t>entre duraciones 7 a 17 min como el Sprint 1, </a:t>
+            </a:r>
+          </a:p>
+          <a:p>
+            <a:r>
+              <a:rPr lang="es-ES" sz="1600" dirty="0"/>
+              <a:t>y que le han llamado en campañas anteriores</a:t>
+            </a:r>
+            <a:r>
+              <a:rPr lang="es-ES" sz="1600" b="1" dirty="0"/>
+              <a:t>.</a:t>
+            </a:r>
+            <a:endParaRPr lang="es-ES" sz="1600" dirty="0"/>
+          </a:p>
+        </p:txBody>
+      </p:sp>
+      <p:sp>
+        <p:nvSpPr>
+          <p:cNvPr id="9" name="Rectángulo: esquinas redondeadas 8">
+            <a:extLst>
+              <a:ext uri="{FF2B5EF4-FFF2-40B4-BE49-F238E27FC236}">
+                <a16:creationId xmlns:a16="http://schemas.microsoft.com/office/drawing/2014/main" id="{3FAEE228-6729-211B-2A46-8B3A02A83818}"/>
+              </a:ext>
+            </a:extLst>
+          </p:cNvPr>
+          <p:cNvSpPr/>
+          <p:nvPr/>
+        </p:nvSpPr>
+        <p:spPr>
+          <a:xfrm>
+            <a:off x="825135" y="1954635"/>
+            <a:ext cx="4042140" cy="327132"/>
+          </a:xfrm>
+          <a:prstGeom prst="roundRect">
+            <a:avLst>
+              <a:gd name="adj" fmla="val 27880"/>
+            </a:avLst>
+          </a:prstGeom>
+          <a:solidFill>
+            <a:srgbClr val="D2ECB6"/>
+          </a:solidFill>
+          <a:ln>
+            <a:solidFill>
+              <a:srgbClr val="92D050"/>
+            </a:solidFill>
+          </a:ln>
+        </p:spPr>
+        <p:style>
+          <a:lnRef idx="2">
+            <a:schemeClr val="accent1">
+              <a:shade val="50000"/>
+            </a:schemeClr>
+          </a:lnRef>
+          <a:fillRef idx="1">
+            <a:schemeClr val="accent1"/>
+          </a:fillRef>
+          <a:effectRef idx="0">
+            <a:schemeClr val="accent1"/>
+          </a:effectRef>
+          <a:fontRef idx="minor">
+            <a:schemeClr val="lt1"/>
+          </a:fontRef>
+        </p:style>
+        <p:txBody>
+          <a:bodyPr rtlCol="0" anchor="ctr"/>
+          <a:lstStyle/>
+          <a:p>
+            <a:pPr algn="ctr"/>
+            <a:r>
+              <a:rPr lang="es-ES" sz="1400" dirty="0">
+                <a:solidFill>
+                  <a:schemeClr val="tx1"/>
+                </a:solidFill>
+              </a:rPr>
+              <a:t>¿Cuándo deberíamos priorizar llamar a teléfono fijo?</a:t>
+            </a:r>
+          </a:p>
+        </p:txBody>
+      </p:sp>
+      <p:sp>
+        <p:nvSpPr>
+          <p:cNvPr id="10" name="Rectángulo: esquinas redondeadas 9">
+            <a:extLst>
+              <a:ext uri="{FF2B5EF4-FFF2-40B4-BE49-F238E27FC236}">
+                <a16:creationId xmlns:a16="http://schemas.microsoft.com/office/drawing/2014/main" id="{BEEFA64B-D29F-CD76-5F2E-B88DC42940CE}"/>
+              </a:ext>
+            </a:extLst>
+          </p:cNvPr>
+          <p:cNvSpPr/>
+          <p:nvPr/>
+        </p:nvSpPr>
+        <p:spPr>
+          <a:xfrm>
+            <a:off x="6863985" y="1908876"/>
+            <a:ext cx="3756390" cy="324423"/>
+          </a:xfrm>
+          <a:prstGeom prst="roundRect">
+            <a:avLst>
+              <a:gd name="adj" fmla="val 27880"/>
+            </a:avLst>
+          </a:prstGeom>
+          <a:solidFill>
+            <a:srgbClr val="D2ECB6"/>
+          </a:solidFill>
+          <a:ln>
+            <a:solidFill>
+              <a:srgbClr val="92D050"/>
+            </a:solidFill>
+          </a:ln>
+        </p:spPr>
+        <p:style>
+          <a:lnRef idx="2">
+            <a:schemeClr val="accent1">
+              <a:shade val="50000"/>
+            </a:schemeClr>
+          </a:lnRef>
+          <a:fillRef idx="1">
+            <a:schemeClr val="accent1"/>
+          </a:fillRef>
+          <a:effectRef idx="0">
+            <a:schemeClr val="accent1"/>
+          </a:effectRef>
+          <a:fontRef idx="minor">
+            <a:schemeClr val="lt1"/>
+          </a:fontRef>
+        </p:style>
+        <p:txBody>
+          <a:bodyPr rtlCol="0" anchor="ctr"/>
+          <a:lstStyle/>
+          <a:p>
+            <a:pPr algn="ctr"/>
             <a:r>
               <a:rPr lang="es-ES" sz="1400" dirty="0">
                 <a:solidFill>
@@ -9687,7 +10184,599 @@
 </p:sld>
 </file>
 
-<file path=ppt/slides/slide11.xml><?xml version="1.0" encoding="utf-8"?>
+<file path=ppt/slides/slide12.xml><?xml version="1.0" encoding="utf-8"?>
+<p:sld xmlns:a="http://schemas.openxmlformats.org/drawingml/2006/main" xmlns:r="http://schemas.openxmlformats.org/officeDocument/2006/relationships" xmlns:p="http://schemas.openxmlformats.org/presentationml/2006/main">
+  <p:cSld>
+    <p:spTree>
+      <p:nvGrpSpPr>
+        <p:cNvPr id="1" name="">
+          <a:extLst>
+            <a:ext uri="{FF2B5EF4-FFF2-40B4-BE49-F238E27FC236}">
+              <a16:creationId xmlns:a16="http://schemas.microsoft.com/office/drawing/2014/main" id="{2E8AFFAE-1245-19B5-3C60-58AC8A5EA54D}"/>
+            </a:ext>
+          </a:extLst>
+        </p:cNvPr>
+        <p:cNvGrpSpPr/>
+        <p:nvPr/>
+      </p:nvGrpSpPr>
+      <p:grpSpPr>
+        <a:xfrm>
+          <a:off x="0" y="0"/>
+          <a:ext cx="0" cy="0"/>
+          <a:chOff x="0" y="0"/>
+          <a:chExt cx="0" cy="0"/>
+        </a:xfrm>
+      </p:grpSpPr>
+      <p:sp>
+        <p:nvSpPr>
+          <p:cNvPr id="6" name="Rectángulo 5">
+            <a:extLst>
+              <a:ext uri="{FF2B5EF4-FFF2-40B4-BE49-F238E27FC236}">
+                <a16:creationId xmlns:a16="http://schemas.microsoft.com/office/drawing/2014/main" id="{82C12619-B1CF-D3F7-B28B-32652C0F05E3}"/>
+              </a:ext>
+            </a:extLst>
+          </p:cNvPr>
+          <p:cNvSpPr/>
+          <p:nvPr/>
+        </p:nvSpPr>
+        <p:spPr>
+          <a:xfrm>
+            <a:off x="0" y="6400800"/>
+            <a:ext cx="2557670" cy="457200"/>
+          </a:xfrm>
+          <a:prstGeom prst="rect">
+            <a:avLst/>
+          </a:prstGeom>
+          <a:solidFill>
+            <a:schemeClr val="bg1">
+              <a:lumMod val="95000"/>
+            </a:schemeClr>
+          </a:solidFill>
+          <a:ln>
+            <a:noFill/>
+          </a:ln>
+        </p:spPr>
+        <p:style>
+          <a:lnRef idx="2">
+            <a:schemeClr val="accent1">
+              <a:shade val="50000"/>
+            </a:schemeClr>
+          </a:lnRef>
+          <a:fillRef idx="1">
+            <a:schemeClr val="accent1"/>
+          </a:fillRef>
+          <a:effectRef idx="0">
+            <a:schemeClr val="accent1"/>
+          </a:effectRef>
+          <a:fontRef idx="minor">
+            <a:schemeClr val="lt1"/>
+          </a:fontRef>
+        </p:style>
+        <p:txBody>
+          <a:bodyPr rtlCol="0" anchor="ctr"/>
+          <a:lstStyle/>
+          <a:p>
+            <a:pPr algn="ctr"/>
+            <a:endParaRPr lang="es-ES"/>
+          </a:p>
+        </p:txBody>
+      </p:sp>
+      <p:sp>
+        <p:nvSpPr>
+          <p:cNvPr id="4" name="Rectángulo: esquinas redondeadas 3">
+            <a:extLst>
+              <a:ext uri="{FF2B5EF4-FFF2-40B4-BE49-F238E27FC236}">
+                <a16:creationId xmlns:a16="http://schemas.microsoft.com/office/drawing/2014/main" id="{0EF04D99-B7F8-3573-2F18-E88215F913F3}"/>
+              </a:ext>
+            </a:extLst>
+          </p:cNvPr>
+          <p:cNvSpPr/>
+          <p:nvPr/>
+        </p:nvSpPr>
+        <p:spPr>
+          <a:xfrm>
+            <a:off x="455833" y="1625256"/>
+            <a:ext cx="5386168" cy="3475353"/>
+          </a:xfrm>
+          <a:prstGeom prst="roundRect">
+            <a:avLst>
+              <a:gd name="adj" fmla="val 7845"/>
+            </a:avLst>
+          </a:prstGeom>
+          <a:solidFill>
+            <a:schemeClr val="bg1"/>
+          </a:solidFill>
+          <a:ln>
+            <a:noFill/>
+          </a:ln>
+        </p:spPr>
+        <p:style>
+          <a:lnRef idx="2">
+            <a:schemeClr val="accent1">
+              <a:shade val="50000"/>
+            </a:schemeClr>
+          </a:lnRef>
+          <a:fillRef idx="1">
+            <a:schemeClr val="accent1"/>
+          </a:fillRef>
+          <a:effectRef idx="0">
+            <a:schemeClr val="accent1"/>
+          </a:effectRef>
+          <a:fontRef idx="minor">
+            <a:schemeClr val="lt1"/>
+          </a:fontRef>
+        </p:style>
+        <p:txBody>
+          <a:bodyPr rtlCol="0" anchor="ctr"/>
+          <a:lstStyle/>
+          <a:p>
+            <a:pPr algn="ctr"/>
+            <a:endParaRPr lang="es-ES" dirty="0"/>
+          </a:p>
+        </p:txBody>
+      </p:sp>
+      <p:sp>
+        <p:nvSpPr>
+          <p:cNvPr id="5" name="QuadreDeText 3">
+            <a:extLst>
+              <a:ext uri="{FF2B5EF4-FFF2-40B4-BE49-F238E27FC236}">
+                <a16:creationId xmlns:a16="http://schemas.microsoft.com/office/drawing/2014/main" id="{8D4C57D9-90FA-1254-9EC5-207A0AEE2D7F}"/>
+              </a:ext>
+            </a:extLst>
+          </p:cNvPr>
+          <p:cNvSpPr txBox="1"/>
+          <p:nvPr/>
+        </p:nvSpPr>
+        <p:spPr>
+          <a:xfrm>
+            <a:off x="505958" y="250347"/>
+            <a:ext cx="11230211" cy="707886"/>
+          </a:xfrm>
+          <a:prstGeom prst="rect">
+            <a:avLst/>
+          </a:prstGeom>
+          <a:noFill/>
+        </p:spPr>
+        <p:txBody>
+          <a:bodyPr wrap="square">
+            <a:spAutoFit/>
+          </a:bodyPr>
+          <a:lstStyle/>
+          <a:p>
+            <a:r>
+              <a:rPr lang="es-ES" sz="2400" b="1" dirty="0">
+                <a:solidFill>
+                  <a:schemeClr val="accent3">
+                    <a:lumMod val="50000"/>
+                  </a:schemeClr>
+                </a:solidFill>
+                <a:effectLst/>
+                <a:latin typeface="+mj-lt"/>
+              </a:rPr>
+              <a:t>PROPUESTAS DE AJUSTE DE LOS MÉTODOS DE CONTACTO</a:t>
+            </a:r>
+          </a:p>
+          <a:p>
+            <a:r>
+              <a:rPr lang="es-ES" sz="1400" b="1" dirty="0"/>
+              <a:t>¿</a:t>
+            </a:r>
+            <a:r>
+              <a:rPr lang="es-ES" sz="1600" b="1" dirty="0"/>
+              <a:t>Qué ajustes podríamos realizar a nuestros métodos de contacto para mejorar la tasa de respuesta?</a:t>
+            </a:r>
+          </a:p>
+        </p:txBody>
+      </p:sp>
+      <p:sp>
+        <p:nvSpPr>
+          <p:cNvPr id="30" name="CuadroTexto 29">
+            <a:extLst>
+              <a:ext uri="{FF2B5EF4-FFF2-40B4-BE49-F238E27FC236}">
+                <a16:creationId xmlns:a16="http://schemas.microsoft.com/office/drawing/2014/main" id="{6B0A3DF6-5B8C-C82E-4007-09D066866A92}"/>
+              </a:ext>
+            </a:extLst>
+          </p:cNvPr>
+          <p:cNvSpPr txBox="1"/>
+          <p:nvPr/>
+        </p:nvSpPr>
+        <p:spPr>
+          <a:xfrm>
+            <a:off x="825136" y="2523782"/>
+            <a:ext cx="4042140" cy="1498283"/>
+          </a:xfrm>
+          <a:prstGeom prst="roundRect">
+            <a:avLst/>
+          </a:prstGeom>
+          <a:noFill/>
+          <a:ln w="19050">
+            <a:solidFill>
+              <a:srgbClr val="92D050"/>
+            </a:solidFill>
+            <a:prstDash val="sysDash"/>
+          </a:ln>
+        </p:spPr>
+        <p:txBody>
+          <a:bodyPr wrap="square">
+            <a:spAutoFit/>
+          </a:bodyPr>
+          <a:lstStyle/>
+          <a:p>
+            <a:pPr marL="171450" indent="-171450" algn="just">
+              <a:spcBef>
+                <a:spcPts val="300"/>
+              </a:spcBef>
+              <a:buFont typeface="Arial" panose="020B0604020202020204" pitchFamily="34" charset="0"/>
+              <a:buChar char="•"/>
+            </a:pPr>
+            <a:r>
+              <a:rPr lang="es-ES" sz="1200" dirty="0"/>
+              <a:t>Llamadas a los clientes mas jóvenes</a:t>
+            </a:r>
+          </a:p>
+          <a:p>
+            <a:pPr marL="171450" indent="-171450" algn="just">
+              <a:spcBef>
+                <a:spcPts val="300"/>
+              </a:spcBef>
+              <a:buFont typeface="Arial" panose="020B0604020202020204" pitchFamily="34" charset="0"/>
+              <a:buChar char="•"/>
+            </a:pPr>
+            <a:r>
+              <a:rPr lang="es-ES" sz="1200" dirty="0"/>
+              <a:t>En los primeros contactos de la campaña</a:t>
+            </a:r>
+          </a:p>
+          <a:p>
+            <a:pPr marL="171450" indent="-171450" algn="just">
+              <a:spcBef>
+                <a:spcPts val="300"/>
+              </a:spcBef>
+              <a:buFont typeface="Arial" panose="020B0604020202020204" pitchFamily="34" charset="0"/>
+              <a:buChar char="•"/>
+            </a:pPr>
+            <a:r>
+              <a:rPr lang="es-ES" sz="1200" dirty="0"/>
+              <a:t>En clientes donde podemos impactar por otras vías como </a:t>
+            </a:r>
+            <a:r>
+              <a:rPr lang="es-ES" sz="1200" dirty="0" err="1"/>
+              <a:t>Whatsapp</a:t>
+            </a:r>
+            <a:r>
+              <a:rPr lang="es-ES" sz="1200" dirty="0"/>
+              <a:t> o Instagram</a:t>
+            </a:r>
+          </a:p>
+          <a:p>
+            <a:pPr marL="171450" indent="-171450" algn="just">
+              <a:spcBef>
+                <a:spcPts val="300"/>
+              </a:spcBef>
+              <a:buFont typeface="Arial" panose="020B0604020202020204" pitchFamily="34" charset="0"/>
+              <a:buChar char="•"/>
+            </a:pPr>
+            <a:endParaRPr lang="es-ES" sz="1200" dirty="0"/>
+          </a:p>
+          <a:p>
+            <a:pPr marL="171450" indent="-171450" algn="just">
+              <a:spcBef>
+                <a:spcPts val="300"/>
+              </a:spcBef>
+              <a:buFont typeface="Arial" panose="020B0604020202020204" pitchFamily="34" charset="0"/>
+              <a:buChar char="•"/>
+            </a:pPr>
+            <a:endParaRPr lang="es-ES" sz="1200" dirty="0"/>
+          </a:p>
+        </p:txBody>
+      </p:sp>
+      <p:sp>
+        <p:nvSpPr>
+          <p:cNvPr id="2" name="CuadroTexto 1">
+            <a:extLst>
+              <a:ext uri="{FF2B5EF4-FFF2-40B4-BE49-F238E27FC236}">
+                <a16:creationId xmlns:a16="http://schemas.microsoft.com/office/drawing/2014/main" id="{FB4A5B90-D21B-B193-A37A-573840257D21}"/>
+              </a:ext>
+            </a:extLst>
+          </p:cNvPr>
+          <p:cNvSpPr txBox="1"/>
+          <p:nvPr/>
+        </p:nvSpPr>
+        <p:spPr>
+          <a:xfrm>
+            <a:off x="531964" y="999357"/>
+            <a:ext cx="7997830" cy="338554"/>
+          </a:xfrm>
+          <a:prstGeom prst="rect">
+            <a:avLst/>
+          </a:prstGeom>
+          <a:noFill/>
+        </p:spPr>
+        <p:txBody>
+          <a:bodyPr wrap="none" rtlCol="0">
+            <a:spAutoFit/>
+          </a:bodyPr>
+          <a:lstStyle/>
+          <a:p>
+            <a:r>
+              <a:rPr lang="es-ES" sz="1600" dirty="0"/>
+              <a:t>Nos enfocaríamos al rango con más probabilidad de contratación, </a:t>
+            </a:r>
+            <a:r>
+              <a:rPr lang="es-ES" sz="1600" b="1" dirty="0"/>
+              <a:t>entre duraciones 0 a 4 min.</a:t>
+            </a:r>
+          </a:p>
+        </p:txBody>
+      </p:sp>
+      <p:sp>
+        <p:nvSpPr>
+          <p:cNvPr id="15" name="Rectángulo: esquinas redondeadas 3">
+            <a:extLst>
+              <a:ext uri="{FF2B5EF4-FFF2-40B4-BE49-F238E27FC236}">
+                <a16:creationId xmlns:a16="http://schemas.microsoft.com/office/drawing/2014/main" id="{1B626C93-A170-470D-B968-2D8062F42C3A}"/>
+              </a:ext>
+            </a:extLst>
+          </p:cNvPr>
+          <p:cNvSpPr/>
+          <p:nvPr/>
+        </p:nvSpPr>
+        <p:spPr>
+          <a:xfrm>
+            <a:off x="6211303" y="1625256"/>
+            <a:ext cx="5386168" cy="3475353"/>
+          </a:xfrm>
+          <a:prstGeom prst="roundRect">
+            <a:avLst>
+              <a:gd name="adj" fmla="val 7845"/>
+            </a:avLst>
+          </a:prstGeom>
+          <a:solidFill>
+            <a:schemeClr val="bg1"/>
+          </a:solidFill>
+          <a:ln>
+            <a:noFill/>
+          </a:ln>
+        </p:spPr>
+        <p:style>
+          <a:lnRef idx="2">
+            <a:schemeClr val="accent1">
+              <a:shade val="50000"/>
+            </a:schemeClr>
+          </a:lnRef>
+          <a:fillRef idx="1">
+            <a:schemeClr val="accent1"/>
+          </a:fillRef>
+          <a:effectRef idx="0">
+            <a:schemeClr val="accent1"/>
+          </a:effectRef>
+          <a:fontRef idx="minor">
+            <a:schemeClr val="lt1"/>
+          </a:fontRef>
+        </p:style>
+        <p:txBody>
+          <a:bodyPr rtlCol="0" anchor="ctr"/>
+          <a:lstStyle/>
+          <a:p>
+            <a:pPr algn="ctr"/>
+            <a:endParaRPr lang="es-ES" dirty="0"/>
+          </a:p>
+        </p:txBody>
+      </p:sp>
+      <p:sp>
+        <p:nvSpPr>
+          <p:cNvPr id="16" name="CuadroTexto 29">
+            <a:extLst>
+              <a:ext uri="{FF2B5EF4-FFF2-40B4-BE49-F238E27FC236}">
+                <a16:creationId xmlns:a16="http://schemas.microsoft.com/office/drawing/2014/main" id="{5CE5D1F2-744F-4C97-9262-9E3CA95848B4}"/>
+              </a:ext>
+            </a:extLst>
+          </p:cNvPr>
+          <p:cNvSpPr txBox="1"/>
+          <p:nvPr/>
+        </p:nvSpPr>
+        <p:spPr>
+          <a:xfrm>
+            <a:off x="6580606" y="2523782"/>
+            <a:ext cx="4042140" cy="1004530"/>
+          </a:xfrm>
+          <a:prstGeom prst="roundRect">
+            <a:avLst/>
+          </a:prstGeom>
+          <a:noFill/>
+          <a:ln w="19050">
+            <a:solidFill>
+              <a:srgbClr val="92D050"/>
+            </a:solidFill>
+            <a:prstDash val="sysDash"/>
+          </a:ln>
+        </p:spPr>
+        <p:txBody>
+          <a:bodyPr wrap="square">
+            <a:spAutoFit/>
+          </a:bodyPr>
+          <a:lstStyle/>
+          <a:p>
+            <a:pPr marL="171450" indent="-171450" algn="just">
+              <a:spcBef>
+                <a:spcPts val="300"/>
+              </a:spcBef>
+              <a:buFont typeface="Arial" panose="020B0604020202020204" pitchFamily="34" charset="0"/>
+              <a:buChar char="•"/>
+            </a:pPr>
+            <a:r>
+              <a:rPr lang="es-ES" sz="1200" dirty="0"/>
+              <a:t>En nuestros clientes más mayores</a:t>
+            </a:r>
+          </a:p>
+          <a:p>
+            <a:pPr marL="171450" indent="-171450" algn="just">
+              <a:spcBef>
+                <a:spcPts val="300"/>
+              </a:spcBef>
+              <a:buFont typeface="Arial" panose="020B0604020202020204" pitchFamily="34" charset="0"/>
+              <a:buChar char="•"/>
+            </a:pPr>
+            <a:r>
+              <a:rPr lang="es-ES" sz="1200" dirty="0"/>
+              <a:t>Cuando sabemos que puede haber una conversación larga</a:t>
+            </a:r>
+          </a:p>
+          <a:p>
+            <a:pPr marL="171450" indent="-171450" algn="just">
+              <a:spcBef>
+                <a:spcPts val="300"/>
+              </a:spcBef>
+              <a:buFont typeface="Arial" panose="020B0604020202020204" pitchFamily="34" charset="0"/>
+              <a:buChar char="•"/>
+            </a:pPr>
+            <a:r>
+              <a:rPr lang="es-ES" sz="1200" dirty="0"/>
+              <a:t>Cuando sabemos que el cliente puede necesitar aclarar dudas</a:t>
+            </a:r>
+          </a:p>
+        </p:txBody>
+      </p:sp>
+      <p:sp>
+        <p:nvSpPr>
+          <p:cNvPr id="13" name="Rectángulo: esquinas redondeadas 8">
+            <a:extLst>
+              <a:ext uri="{FF2B5EF4-FFF2-40B4-BE49-F238E27FC236}">
+                <a16:creationId xmlns:a16="http://schemas.microsoft.com/office/drawing/2014/main" id="{C63DFFA6-B811-4DBE-820F-AE3968DCEF0B}"/>
+              </a:ext>
+            </a:extLst>
+          </p:cNvPr>
+          <p:cNvSpPr/>
+          <p:nvPr/>
+        </p:nvSpPr>
+        <p:spPr>
+          <a:xfrm>
+            <a:off x="825136" y="1841368"/>
+            <a:ext cx="4042140" cy="327132"/>
+          </a:xfrm>
+          <a:prstGeom prst="roundRect">
+            <a:avLst>
+              <a:gd name="adj" fmla="val 27880"/>
+            </a:avLst>
+          </a:prstGeom>
+          <a:solidFill>
+            <a:srgbClr val="D2ECB6"/>
+          </a:solidFill>
+          <a:ln>
+            <a:solidFill>
+              <a:srgbClr val="92D050"/>
+            </a:solidFill>
+          </a:ln>
+        </p:spPr>
+        <p:style>
+          <a:lnRef idx="2">
+            <a:schemeClr val="accent1">
+              <a:shade val="50000"/>
+            </a:schemeClr>
+          </a:lnRef>
+          <a:fillRef idx="1">
+            <a:schemeClr val="accent1"/>
+          </a:fillRef>
+          <a:effectRef idx="0">
+            <a:schemeClr val="accent1"/>
+          </a:effectRef>
+          <a:fontRef idx="minor">
+            <a:schemeClr val="lt1"/>
+          </a:fontRef>
+        </p:style>
+        <p:txBody>
+          <a:bodyPr rtlCol="0" anchor="ctr"/>
+          <a:lstStyle/>
+          <a:p>
+            <a:pPr algn="ctr"/>
+            <a:r>
+              <a:rPr lang="es-ES" sz="1400" dirty="0">
+                <a:solidFill>
+                  <a:schemeClr val="tx1"/>
+                </a:solidFill>
+              </a:rPr>
+              <a:t>¿Cuándo deberíamos priorizar llamar a móvil?</a:t>
+            </a:r>
+          </a:p>
+        </p:txBody>
+      </p:sp>
+      <p:sp>
+        <p:nvSpPr>
+          <p:cNvPr id="14" name="Rectángulo: esquinas redondeadas 8">
+            <a:extLst>
+              <a:ext uri="{FF2B5EF4-FFF2-40B4-BE49-F238E27FC236}">
+                <a16:creationId xmlns:a16="http://schemas.microsoft.com/office/drawing/2014/main" id="{4CFC58BD-D9E7-4EB4-B18D-C06544830950}"/>
+              </a:ext>
+            </a:extLst>
+          </p:cNvPr>
+          <p:cNvSpPr/>
+          <p:nvPr/>
+        </p:nvSpPr>
+        <p:spPr>
+          <a:xfrm>
+            <a:off x="6580606" y="1863139"/>
+            <a:ext cx="4042140" cy="327132"/>
+          </a:xfrm>
+          <a:prstGeom prst="roundRect">
+            <a:avLst>
+              <a:gd name="adj" fmla="val 27880"/>
+            </a:avLst>
+          </a:prstGeom>
+          <a:solidFill>
+            <a:srgbClr val="D2ECB6"/>
+          </a:solidFill>
+          <a:ln>
+            <a:solidFill>
+              <a:srgbClr val="92D050"/>
+            </a:solidFill>
+          </a:ln>
+        </p:spPr>
+        <p:style>
+          <a:lnRef idx="2">
+            <a:schemeClr val="accent1">
+              <a:shade val="50000"/>
+            </a:schemeClr>
+          </a:lnRef>
+          <a:fillRef idx="1">
+            <a:schemeClr val="accent1"/>
+          </a:fillRef>
+          <a:effectRef idx="0">
+            <a:schemeClr val="accent1"/>
+          </a:effectRef>
+          <a:fontRef idx="minor">
+            <a:schemeClr val="lt1"/>
+          </a:fontRef>
+        </p:style>
+        <p:txBody>
+          <a:bodyPr rtlCol="0" anchor="ctr"/>
+          <a:lstStyle/>
+          <a:p>
+            <a:pPr algn="ctr"/>
+            <a:r>
+              <a:rPr lang="es-ES" sz="1400" dirty="0">
+                <a:solidFill>
+                  <a:schemeClr val="tx1"/>
+                </a:solidFill>
+              </a:rPr>
+              <a:t>¿Cuándo deberíamos priorizar llamar a teléfono fijo?</a:t>
+            </a:r>
+          </a:p>
+        </p:txBody>
+      </p:sp>
+    </p:spTree>
+    <p:extLst>
+      <p:ext uri="{BB962C8B-B14F-4D97-AF65-F5344CB8AC3E}">
+        <p14:creationId xmlns:p14="http://schemas.microsoft.com/office/powerpoint/2010/main" val="2161759695"/>
+      </p:ext>
+    </p:extLst>
+  </p:cSld>
+  <p:clrMapOvr>
+    <a:masterClrMapping/>
+  </p:clrMapOvr>
+</p:sld>
+</file>
+
+<file path=ppt/slides/slide13.xml><?xml version="1.0" encoding="utf-8"?>
 <p:sld xmlns:a="http://schemas.openxmlformats.org/drawingml/2006/main" xmlns:r="http://schemas.openxmlformats.org/officeDocument/2006/relationships" xmlns:p="http://schemas.openxmlformats.org/presentationml/2006/main">
   <p:cSld>
     <p:spTree>
@@ -10342,7 +11431,7 @@
 </p:sld>
 </file>
 
-<file path=ppt/slides/slide12.xml><?xml version="1.0" encoding="utf-8"?>
+<file path=ppt/slides/slide14.xml><?xml version="1.0" encoding="utf-8"?>
 <p:sld xmlns:a="http://schemas.openxmlformats.org/drawingml/2006/main" xmlns:r="http://schemas.openxmlformats.org/officeDocument/2006/relationships" xmlns:p="http://schemas.openxmlformats.org/presentationml/2006/main">
   <p:cSld>
     <p:bg>
@@ -11002,165 +12091,13 @@
           <a:p>
             <a:r>
               <a:rPr lang="es-ES" dirty="0"/>
-              <a:t>Quin </a:t>
-            </a:r>
-            <a:r>
-              <a:rPr lang="es-ES" dirty="0" err="1"/>
-              <a:t>és</a:t>
-            </a:r>
+              <a:t>¿Cuál es el impacto del tipo de contacto, ya sea móvil o telefónico, en la tasa de conversión de nuestras campañas de marketing?</a:t>
+            </a:r>
+          </a:p>
+          <a:p>
             <a:r>
               <a:rPr lang="es-ES" dirty="0"/>
-              <a:t> </a:t>
-            </a:r>
-            <a:r>
-              <a:rPr lang="es-ES" dirty="0" err="1"/>
-              <a:t>l'impacte</a:t>
-            </a:r>
-            <a:r>
-              <a:rPr lang="es-ES" dirty="0"/>
-              <a:t> del </a:t>
-            </a:r>
-            <a:r>
-              <a:rPr lang="es-ES" dirty="0" err="1"/>
-              <a:t>tipus</a:t>
-            </a:r>
-            <a:r>
-              <a:rPr lang="es-ES" dirty="0"/>
-              <a:t> de contacte, ja </a:t>
-            </a:r>
-            <a:r>
-              <a:rPr lang="es-ES" dirty="0" err="1"/>
-              <a:t>sigui</a:t>
-            </a:r>
-            <a:r>
-              <a:rPr lang="es-ES" dirty="0"/>
-              <a:t> </a:t>
-            </a:r>
-            <a:r>
-              <a:rPr lang="es-ES" dirty="0" err="1"/>
-              <a:t>mòbil</a:t>
-            </a:r>
-            <a:r>
-              <a:rPr lang="es-ES" dirty="0"/>
-              <a:t> o </a:t>
-            </a:r>
-            <a:r>
-              <a:rPr lang="es-ES" dirty="0" err="1"/>
-              <a:t>telefònic</a:t>
-            </a:r>
-            <a:r>
-              <a:rPr lang="es-ES" dirty="0"/>
-              <a:t>, a la </a:t>
-            </a:r>
-            <a:r>
-              <a:rPr lang="es-ES" dirty="0" err="1"/>
-              <a:t>taxa</a:t>
-            </a:r>
-            <a:r>
-              <a:rPr lang="es-ES" dirty="0"/>
-              <a:t> de </a:t>
-            </a:r>
-            <a:r>
-              <a:rPr lang="es-ES" dirty="0" err="1"/>
-              <a:t>conversió</a:t>
-            </a:r>
-            <a:r>
-              <a:rPr lang="es-ES" dirty="0"/>
-              <a:t> de les </a:t>
-            </a:r>
-            <a:r>
-              <a:rPr lang="es-ES" dirty="0" err="1"/>
-              <a:t>nostres</a:t>
-            </a:r>
-            <a:r>
-              <a:rPr lang="es-ES" dirty="0"/>
-              <a:t> </a:t>
-            </a:r>
-            <a:r>
-              <a:rPr lang="es-ES" dirty="0" err="1"/>
-              <a:t>campanyes</a:t>
-            </a:r>
-            <a:r>
-              <a:rPr lang="es-ES" dirty="0"/>
-              <a:t> de </a:t>
-            </a:r>
-            <a:r>
-              <a:rPr lang="es-ES" dirty="0" err="1"/>
-              <a:t>màrqueting</a:t>
-            </a:r>
-            <a:r>
-              <a:rPr lang="es-ES" dirty="0"/>
-              <a:t>, i</a:t>
-            </a:r>
-          </a:p>
-          <a:p>
-            <a:r>
-              <a:rPr lang="es-ES" dirty="0"/>
-              <a:t> </a:t>
-            </a:r>
-            <a:r>
-              <a:rPr lang="es-ES" dirty="0" err="1"/>
-              <a:t>Com</a:t>
-            </a:r>
-            <a:r>
-              <a:rPr lang="es-ES" dirty="0"/>
-              <a:t> </a:t>
-            </a:r>
-            <a:r>
-              <a:rPr lang="es-ES" dirty="0" err="1"/>
-              <a:t>podem</a:t>
-            </a:r>
-            <a:r>
-              <a:rPr lang="es-ES" dirty="0"/>
-              <a:t> ajustar les </a:t>
-            </a:r>
-            <a:r>
-              <a:rPr lang="es-ES" dirty="0" err="1"/>
-              <a:t>nostres</a:t>
-            </a:r>
-            <a:r>
-              <a:rPr lang="es-ES" dirty="0"/>
-              <a:t> </a:t>
-            </a:r>
-            <a:r>
-              <a:rPr lang="es-ES" dirty="0" err="1"/>
-              <a:t>estratègies</a:t>
-            </a:r>
-            <a:r>
-              <a:rPr lang="es-ES" dirty="0"/>
-              <a:t> de </a:t>
-            </a:r>
-            <a:r>
-              <a:rPr lang="es-ES" dirty="0" err="1"/>
-              <a:t>comunicació</a:t>
-            </a:r>
-            <a:r>
-              <a:rPr lang="es-ES" dirty="0"/>
-              <a:t> en </a:t>
-            </a:r>
-            <a:r>
-              <a:rPr lang="es-ES" dirty="0" err="1"/>
-              <a:t>funció</a:t>
-            </a:r>
-            <a:r>
-              <a:rPr lang="es-ES" dirty="0"/>
-              <a:t> </a:t>
-            </a:r>
-            <a:r>
-              <a:rPr lang="es-ES" dirty="0" err="1"/>
-              <a:t>d'aquests</a:t>
-            </a:r>
-            <a:r>
-              <a:rPr lang="es-ES" dirty="0"/>
-              <a:t> </a:t>
-            </a:r>
-            <a:r>
-              <a:rPr lang="es-ES" dirty="0" err="1"/>
-              <a:t>resultats</a:t>
-            </a:r>
-            <a:r>
-              <a:rPr lang="es-ES" dirty="0"/>
-              <a:t>?</a:t>
+              <a:t> ¿Cómo podemos ajustar nuestras estrategias de comunicación en función de estos resultados?</a:t>
             </a:r>
           </a:p>
         </p:txBody>
@@ -12405,10 +13342,10 @@
       </p:sp>
       <p:pic>
         <p:nvPicPr>
-          <p:cNvPr id="6" name="Picture 5">
-            <a:extLst>
-              <a:ext uri="{FF2B5EF4-FFF2-40B4-BE49-F238E27FC236}">
-                <a16:creationId xmlns:a16="http://schemas.microsoft.com/office/drawing/2014/main" id="{A0634202-0B62-4993-B1A0-8B36EBDF8445}"/>
+          <p:cNvPr id="3" name="Picture 2">
+            <a:extLst>
+              <a:ext uri="{FF2B5EF4-FFF2-40B4-BE49-F238E27FC236}">
+                <a16:creationId xmlns:a16="http://schemas.microsoft.com/office/drawing/2014/main" id="{94E8F279-2F54-460E-8FB9-3302AA98C417}"/>
               </a:ext>
             </a:extLst>
           </p:cNvPr>
@@ -12425,8 +13362,8 @@
         </p:blipFill>
         <p:spPr>
           <a:xfrm>
-            <a:off x="828619" y="832298"/>
-            <a:ext cx="7431461" cy="5775355"/>
+            <a:off x="501928" y="831058"/>
+            <a:ext cx="8245832" cy="5939128"/>
           </a:xfrm>
           <a:prstGeom prst="rect">
             <a:avLst/>
@@ -12741,12 +13678,62 @@
           </a:p>
         </p:txBody>
       </p:sp>
+      <p:sp>
+        <p:nvSpPr>
+          <p:cNvPr id="12" name="QuadreDeText 16">
+            <a:extLst>
+              <a:ext uri="{FF2B5EF4-FFF2-40B4-BE49-F238E27FC236}">
+                <a16:creationId xmlns:a16="http://schemas.microsoft.com/office/drawing/2014/main" id="{D9D14259-6AC5-4A23-8868-B9C97E794FCF}"/>
+              </a:ext>
+            </a:extLst>
+          </p:cNvPr>
+          <p:cNvSpPr txBox="1"/>
+          <p:nvPr/>
+        </p:nvSpPr>
+        <p:spPr>
+          <a:xfrm>
+            <a:off x="9310291" y="4882738"/>
+            <a:ext cx="2253058" cy="1770698"/>
+          </a:xfrm>
+          <a:prstGeom prst="roundRect">
+            <a:avLst/>
+          </a:prstGeom>
+          <a:solidFill>
+            <a:schemeClr val="accent5">
+              <a:lumMod val="25000"/>
+              <a:lumOff val="75000"/>
+            </a:schemeClr>
+          </a:solidFill>
+          <a:ln>
+            <a:solidFill>
+              <a:schemeClr val="bg1"/>
+            </a:solidFill>
+          </a:ln>
+        </p:spPr>
+        <p:txBody>
+          <a:bodyPr wrap="square">
+            <a:spAutoFit/>
+          </a:bodyPr>
+          <a:lstStyle/>
+          <a:p>
+            <a:r>
+              <a:rPr lang="es-ES" sz="1400" b="1" dirty="0"/>
+              <a:t>Clientes de mediana edad (40-49 años):</a:t>
+            </a:r>
+            <a:r>
+              <a:rPr lang="es-ES" sz="1400" dirty="0"/>
+              <a:t> Las llamadas móviles son significativamente más largas que las telefónicas, lo que sugiere una mayor efectividad en este canal.</a:t>
+            </a:r>
+            <a:endParaRPr lang="es-ES" sz="1300" dirty="0"/>
+          </a:p>
+        </p:txBody>
+      </p:sp>
       <p:pic>
         <p:nvPicPr>
-          <p:cNvPr id="3" name="Picture 2">
-            <a:extLst>
-              <a:ext uri="{FF2B5EF4-FFF2-40B4-BE49-F238E27FC236}">
-                <a16:creationId xmlns:a16="http://schemas.microsoft.com/office/drawing/2014/main" id="{5154F511-574B-4BCB-869B-32C1B260441A}"/>
+          <p:cNvPr id="4" name="Picture 3">
+            <a:extLst>
+              <a:ext uri="{FF2B5EF4-FFF2-40B4-BE49-F238E27FC236}">
+                <a16:creationId xmlns:a16="http://schemas.microsoft.com/office/drawing/2014/main" id="{B4739955-D123-409A-9859-D5D185A9CF51}"/>
               </a:ext>
             </a:extLst>
           </p:cNvPr>
@@ -12763,64 +13750,14 @@
         </p:blipFill>
         <p:spPr>
           <a:xfrm>
-            <a:off x="639365" y="712012"/>
-            <a:ext cx="8005555" cy="5940156"/>
+            <a:off x="505959" y="751892"/>
+            <a:ext cx="8536441" cy="5901544"/>
           </a:xfrm>
           <a:prstGeom prst="rect">
             <a:avLst/>
           </a:prstGeom>
         </p:spPr>
       </p:pic>
-      <p:sp>
-        <p:nvSpPr>
-          <p:cNvPr id="12" name="QuadreDeText 16">
-            <a:extLst>
-              <a:ext uri="{FF2B5EF4-FFF2-40B4-BE49-F238E27FC236}">
-                <a16:creationId xmlns:a16="http://schemas.microsoft.com/office/drawing/2014/main" id="{D9D14259-6AC5-4A23-8868-B9C97E794FCF}"/>
-              </a:ext>
-            </a:extLst>
-          </p:cNvPr>
-          <p:cNvSpPr txBox="1"/>
-          <p:nvPr/>
-        </p:nvSpPr>
-        <p:spPr>
-          <a:xfrm>
-            <a:off x="9310291" y="4882738"/>
-            <a:ext cx="2253058" cy="1770698"/>
-          </a:xfrm>
-          <a:prstGeom prst="roundRect">
-            <a:avLst/>
-          </a:prstGeom>
-          <a:solidFill>
-            <a:schemeClr val="accent5">
-              <a:lumMod val="25000"/>
-              <a:lumOff val="75000"/>
-            </a:schemeClr>
-          </a:solidFill>
-          <a:ln>
-            <a:solidFill>
-              <a:schemeClr val="bg1"/>
-            </a:solidFill>
-          </a:ln>
-        </p:spPr>
-        <p:txBody>
-          <a:bodyPr wrap="square">
-            <a:spAutoFit/>
-          </a:bodyPr>
-          <a:lstStyle/>
-          <a:p>
-            <a:r>
-              <a:rPr lang="es-ES" sz="1400" b="1" dirty="0"/>
-              <a:t>Clientes de mediana edad (40-49 años):</a:t>
-            </a:r>
-            <a:r>
-              <a:rPr lang="es-ES" sz="1400" dirty="0"/>
-              <a:t> Las llamadas móviles son significativamente más largas que las telefónicas, lo que sugiere una mayor efectividad en este canal.</a:t>
-            </a:r>
-            <a:endParaRPr lang="es-ES" sz="1300" dirty="0"/>
-          </a:p>
-        </p:txBody>
-      </p:sp>
     </p:spTree>
     <p:extLst>
       <p:ext uri="{BB962C8B-B14F-4D97-AF65-F5344CB8AC3E}">
@@ -14074,15 +15011,7 @@
             </a:r>
             <a:r>
               <a:rPr lang="es-ES" sz="1300" dirty="0"/>
-              <a:t> </a:t>
-            </a:r>
-            <a:r>
-              <a:rPr lang="es-ES" sz="1300" dirty="0" err="1"/>
-              <a:t>concluïmos</a:t>
-            </a:r>
-            <a:r>
-              <a:rPr lang="es-ES" sz="1300" dirty="0"/>
-              <a:t>:</a:t>
+              <a:t> concluimos:</a:t>
             </a:r>
           </a:p>
         </p:txBody>

</xml_diff>